<commit_message>
Update PR based on comments
</commit_message>
<xml_diff>
--- a/docs/diagrams/diagrams.pptx
+++ b/docs/diagrams/diagrams.pptx
@@ -245,7 +245,7 @@
           <a:p>
             <a:fld id="{F4C5997A-E221-43A6-9AE7-DBA0CB9777B0}" type="datetimeFigureOut">
               <a:rPr lang="en-US" smtClean="0"/>
-              <a:t>6/26/2018</a:t>
+              <a:t>6/27/2018</a:t>
             </a:fld>
             <a:endParaRPr lang="en-US"/>
           </a:p>
@@ -415,7 +415,7 @@
           <a:p>
             <a:fld id="{F4C5997A-E221-43A6-9AE7-DBA0CB9777B0}" type="datetimeFigureOut">
               <a:rPr lang="en-US" smtClean="0"/>
-              <a:t>6/26/2018</a:t>
+              <a:t>6/27/2018</a:t>
             </a:fld>
             <a:endParaRPr lang="en-US"/>
           </a:p>
@@ -595,7 +595,7 @@
           <a:p>
             <a:fld id="{F4C5997A-E221-43A6-9AE7-DBA0CB9777B0}" type="datetimeFigureOut">
               <a:rPr lang="en-US" smtClean="0"/>
-              <a:t>6/26/2018</a:t>
+              <a:t>6/27/2018</a:t>
             </a:fld>
             <a:endParaRPr lang="en-US"/>
           </a:p>
@@ -765,7 +765,7 @@
           <a:p>
             <a:fld id="{F4C5997A-E221-43A6-9AE7-DBA0CB9777B0}" type="datetimeFigureOut">
               <a:rPr lang="en-US" smtClean="0"/>
-              <a:t>6/26/2018</a:t>
+              <a:t>6/27/2018</a:t>
             </a:fld>
             <a:endParaRPr lang="en-US"/>
           </a:p>
@@ -1011,7 +1011,7 @@
           <a:p>
             <a:fld id="{F4C5997A-E221-43A6-9AE7-DBA0CB9777B0}" type="datetimeFigureOut">
               <a:rPr lang="en-US" smtClean="0"/>
-              <a:t>6/26/2018</a:t>
+              <a:t>6/27/2018</a:t>
             </a:fld>
             <a:endParaRPr lang="en-US"/>
           </a:p>
@@ -1243,7 +1243,7 @@
           <a:p>
             <a:fld id="{F4C5997A-E221-43A6-9AE7-DBA0CB9777B0}" type="datetimeFigureOut">
               <a:rPr lang="en-US" smtClean="0"/>
-              <a:t>6/26/2018</a:t>
+              <a:t>6/27/2018</a:t>
             </a:fld>
             <a:endParaRPr lang="en-US"/>
           </a:p>
@@ -1610,7 +1610,7 @@
           <a:p>
             <a:fld id="{F4C5997A-E221-43A6-9AE7-DBA0CB9777B0}" type="datetimeFigureOut">
               <a:rPr lang="en-US" smtClean="0"/>
-              <a:t>6/26/2018</a:t>
+              <a:t>6/27/2018</a:t>
             </a:fld>
             <a:endParaRPr lang="en-US"/>
           </a:p>
@@ -1728,7 +1728,7 @@
           <a:p>
             <a:fld id="{F4C5997A-E221-43A6-9AE7-DBA0CB9777B0}" type="datetimeFigureOut">
               <a:rPr lang="en-US" smtClean="0"/>
-              <a:t>6/26/2018</a:t>
+              <a:t>6/27/2018</a:t>
             </a:fld>
             <a:endParaRPr lang="en-US"/>
           </a:p>
@@ -1823,7 +1823,7 @@
           <a:p>
             <a:fld id="{F4C5997A-E221-43A6-9AE7-DBA0CB9777B0}" type="datetimeFigureOut">
               <a:rPr lang="en-US" smtClean="0"/>
-              <a:t>6/26/2018</a:t>
+              <a:t>6/27/2018</a:t>
             </a:fld>
             <a:endParaRPr lang="en-US"/>
           </a:p>
@@ -2100,7 +2100,7 @@
           <a:p>
             <a:fld id="{F4C5997A-E221-43A6-9AE7-DBA0CB9777B0}" type="datetimeFigureOut">
               <a:rPr lang="en-US" smtClean="0"/>
-              <a:t>6/26/2018</a:t>
+              <a:t>6/27/2018</a:t>
             </a:fld>
             <a:endParaRPr lang="en-US"/>
           </a:p>
@@ -2353,7 +2353,7 @@
           <a:p>
             <a:fld id="{F4C5997A-E221-43A6-9AE7-DBA0CB9777B0}" type="datetimeFigureOut">
               <a:rPr lang="en-US" smtClean="0"/>
-              <a:t>6/26/2018</a:t>
+              <a:t>6/27/2018</a:t>
             </a:fld>
             <a:endParaRPr lang="en-US"/>
           </a:p>
@@ -2566,7 +2566,7 @@
           <a:p>
             <a:fld id="{F4C5997A-E221-43A6-9AE7-DBA0CB9777B0}" type="datetimeFigureOut">
               <a:rPr lang="en-US" smtClean="0"/>
-              <a:t>6/26/2018</a:t>
+              <a:t>6/27/2018</a:t>
             </a:fld>
             <a:endParaRPr lang="en-US"/>
           </a:p>
@@ -3467,63 +3467,14 @@
       </p:grpSpPr>
       <p:sp>
         <p:nvSpPr>
-          <p:cNvPr id="91" name="Rectangle 90"/>
-          <p:cNvSpPr/>
-          <p:nvPr/>
-        </p:nvSpPr>
-        <p:spPr>
-          <a:xfrm>
-            <a:off x="3369420" y="138927"/>
-            <a:ext cx="4954391" cy="1584959"/>
-          </a:xfrm>
-          <a:prstGeom prst="rect">
-            <a:avLst/>
-          </a:prstGeom>
-          <a:solidFill>
-            <a:schemeClr val="bg1">
-              <a:lumMod val="95000"/>
-            </a:schemeClr>
-          </a:solidFill>
-          <a:ln>
-            <a:noFill/>
-          </a:ln>
-          <a:effectLst/>
-        </p:spPr>
-        <p:style>
-          <a:lnRef idx="2">
-            <a:schemeClr val="accent1">
-              <a:shade val="50000"/>
-            </a:schemeClr>
-          </a:lnRef>
-          <a:fillRef idx="1">
-            <a:schemeClr val="accent1"/>
-          </a:fillRef>
-          <a:effectRef idx="0">
-            <a:schemeClr val="accent1"/>
-          </a:effectRef>
-          <a:fontRef idx="minor">
-            <a:schemeClr val="lt1"/>
-          </a:fontRef>
-        </p:style>
-        <p:txBody>
-          <a:bodyPr rtlCol="0" anchor="ctr"/>
-          <a:lstStyle/>
-          <a:p>
-            <a:pPr algn="ctr"/>
-            <a:endParaRPr lang="en-US"/>
-          </a:p>
-        </p:txBody>
-      </p:sp>
-      <p:sp>
-        <p:nvSpPr>
           <p:cNvPr id="89" name="Rectangle 88"/>
           <p:cNvSpPr/>
           <p:nvPr/>
         </p:nvSpPr>
         <p:spPr>
           <a:xfrm>
-            <a:off x="4269941" y="1888895"/>
-            <a:ext cx="4057394" cy="1544287"/>
+            <a:off x="4721559" y="1888895"/>
+            <a:ext cx="3605776" cy="1544287"/>
           </a:xfrm>
           <a:prstGeom prst="rect">
             <a:avLst/>
@@ -3572,8 +3523,8 @@
         </p:nvSpPr>
         <p:spPr>
           <a:xfrm>
-            <a:off x="4269941" y="3660278"/>
-            <a:ext cx="4053870" cy="1616097"/>
+            <a:off x="4721559" y="3660278"/>
+            <a:ext cx="3602251" cy="1616097"/>
           </a:xfrm>
           <a:prstGeom prst="rect">
             <a:avLst/>
@@ -3850,69 +3801,6 @@
             <a:r>
               <a:rPr lang="en-US" sz="1200" dirty="0" smtClean="0"/>
               <a:t>Analyzer</a:t>
-            </a:r>
-            <a:endParaRPr lang="en-US" sz="1200" dirty="0"/>
-          </a:p>
-        </p:txBody>
-      </p:sp>
-      <p:sp>
-        <p:nvSpPr>
-          <p:cNvPr id="11" name="Rectangle 10"/>
-          <p:cNvSpPr/>
-          <p:nvPr/>
-        </p:nvSpPr>
-        <p:spPr>
-          <a:xfrm>
-            <a:off x="3529337" y="717381"/>
-            <a:ext cx="572280" cy="887767"/>
-          </a:xfrm>
-          <a:prstGeom prst="rect">
-            <a:avLst/>
-          </a:prstGeom>
-          <a:solidFill>
-            <a:schemeClr val="bg1">
-              <a:lumMod val="65000"/>
-            </a:schemeClr>
-          </a:solidFill>
-          <a:ln>
-            <a:solidFill>
-              <a:schemeClr val="bg1">
-                <a:lumMod val="65000"/>
-              </a:schemeClr>
-            </a:solidFill>
-          </a:ln>
-        </p:spPr>
-        <p:style>
-          <a:lnRef idx="2">
-            <a:schemeClr val="accent1">
-              <a:shade val="50000"/>
-            </a:schemeClr>
-          </a:lnRef>
-          <a:fillRef idx="1">
-            <a:schemeClr val="accent1"/>
-          </a:fillRef>
-          <a:effectRef idx="0">
-            <a:schemeClr val="accent1"/>
-          </a:effectRef>
-          <a:fontRef idx="minor">
-            <a:schemeClr val="lt1"/>
-          </a:fontRef>
-        </p:style>
-        <p:txBody>
-          <a:bodyPr vert="vert270" rtlCol="0" anchor="ctr"/>
-          <a:lstStyle/>
-          <a:p>
-            <a:pPr algn="ctr"/>
-            <a:r>
-              <a:rPr lang="en-US" sz="1200" dirty="0" smtClean="0"/>
-              <a:t>GitHub</a:t>
-            </a:r>
-            <a:br>
-              <a:rPr lang="en-US" sz="1200" dirty="0" smtClean="0"/>
-            </a:br>
-            <a:r>
-              <a:rPr lang="en-US" sz="1200" dirty="0" smtClean="0"/>
-              <a:t>Downloader</a:t>
             </a:r>
             <a:endParaRPr lang="en-US" sz="1200" dirty="0"/>
           </a:p>
@@ -6555,8 +6443,8 @@
         </p:nvSpPr>
         <p:spPr>
           <a:xfrm rot="5400000">
-            <a:off x="6113380" y="3296306"/>
-            <a:ext cx="253450" cy="3621406"/>
+            <a:off x="6384841" y="3575029"/>
+            <a:ext cx="260712" cy="3071221"/>
           </a:xfrm>
           <a:prstGeom prst="rect">
             <a:avLst/>
@@ -6840,101 +6728,6 @@
           </a:fontRef>
         </p:style>
       </p:cxnSp>
-      <p:sp>
-        <p:nvSpPr>
-          <p:cNvPr id="120" name="Rectangle 119"/>
-          <p:cNvSpPr/>
-          <p:nvPr/>
-        </p:nvSpPr>
-        <p:spPr>
-          <a:xfrm rot="5400000">
-            <a:off x="5636659" y="-1869547"/>
-            <a:ext cx="285006" cy="4505524"/>
-          </a:xfrm>
-          <a:prstGeom prst="rect">
-            <a:avLst/>
-          </a:prstGeom>
-          <a:solidFill>
-            <a:schemeClr val="bg1">
-              <a:lumMod val="65000"/>
-            </a:schemeClr>
-          </a:solidFill>
-          <a:ln>
-            <a:solidFill>
-              <a:schemeClr val="bg1">
-                <a:lumMod val="65000"/>
-              </a:schemeClr>
-            </a:solidFill>
-          </a:ln>
-        </p:spPr>
-        <p:style>
-          <a:lnRef idx="2">
-            <a:schemeClr val="accent1">
-              <a:shade val="50000"/>
-            </a:schemeClr>
-          </a:lnRef>
-          <a:fillRef idx="1">
-            <a:schemeClr val="accent1"/>
-          </a:fillRef>
-          <a:effectRef idx="0">
-            <a:schemeClr val="accent1"/>
-          </a:effectRef>
-          <a:fontRef idx="minor">
-            <a:schemeClr val="lt1"/>
-          </a:fontRef>
-        </p:style>
-        <p:txBody>
-          <a:bodyPr vert="vert270" rtlCol="0" anchor="ctr"/>
-          <a:lstStyle/>
-          <a:p>
-            <a:pPr algn="ctr"/>
-            <a:r>
-              <a:rPr lang="en-US" sz="1200" dirty="0" err="1" smtClean="0"/>
-              <a:t>ProjectManagementReporter</a:t>
-            </a:r>
-            <a:endParaRPr lang="en-US" sz="1200" dirty="0"/>
-          </a:p>
-        </p:txBody>
-      </p:sp>
-      <p:cxnSp>
-        <p:nvCxnSpPr>
-          <p:cNvPr id="121" name="Straight Arrow Connector 120"/>
-          <p:cNvCxnSpPr/>
-          <p:nvPr/>
-        </p:nvCxnSpPr>
-        <p:spPr>
-          <a:xfrm flipH="1">
-            <a:off x="3817511" y="525718"/>
-            <a:ext cx="77" cy="203804"/>
-          </a:xfrm>
-          <a:prstGeom prst="straightConnector1">
-            <a:avLst/>
-          </a:prstGeom>
-          <a:ln w="19050">
-            <a:solidFill>
-              <a:schemeClr val="bg1">
-                <a:lumMod val="65000"/>
-              </a:schemeClr>
-            </a:solidFill>
-            <a:prstDash val="lgDash"/>
-            <a:tailEnd type="triangle"/>
-          </a:ln>
-        </p:spPr>
-        <p:style>
-          <a:lnRef idx="1">
-            <a:schemeClr val="accent1"/>
-          </a:lnRef>
-          <a:fillRef idx="0">
-            <a:schemeClr val="accent1"/>
-          </a:fillRef>
-          <a:effectRef idx="0">
-            <a:schemeClr val="accent1"/>
-          </a:effectRef>
-          <a:fontRef idx="minor">
-            <a:schemeClr val="tx1"/>
-          </a:fontRef>
-        </p:style>
-      </p:cxnSp>
       <p:cxnSp>
         <p:nvCxnSpPr>
           <p:cNvPr id="3" name="Straight Arrow Connector 2"/>
@@ -6943,7 +6736,7 @@
         </p:nvCxnSpPr>
         <p:spPr>
           <a:xfrm>
-            <a:off x="9336728" y="826204"/>
+            <a:off x="9152822" y="1963274"/>
             <a:ext cx="778669" cy="0"/>
           </a:xfrm>
           <a:prstGeom prst="straightConnector1">
@@ -6982,7 +6775,7 @@
         </p:nvSpPr>
         <p:spPr>
           <a:xfrm>
-            <a:off x="10174531" y="687704"/>
+            <a:off x="10056290" y="1875652"/>
             <a:ext cx="847133" cy="276999"/>
           </a:xfrm>
           <a:prstGeom prst="rect">
@@ -8617,7 +8410,7 @@
                             </p:stCondLst>
                             <p:childTnLst>
                               <p:par>
-                                <p:cTn id="107" presetID="10" presetClass="entr" presetSubtype="0" fill="hold" grpId="0" nodeType="clickEffect">
+                                <p:cTn id="107" presetID="10" presetClass="entr" presetSubtype="0" fill="hold" nodeType="clickEffect">
                                   <p:stCondLst>
                                     <p:cond delay="0"/>
                                   </p:stCondLst>
@@ -8630,7 +8423,7 @@
                                           </p:stCondLst>
                                         </p:cTn>
                                         <p:tgtEl>
-                                          <p:spTgt spid="91"/>
+                                          <p:spTgt spid="97"/>
                                         </p:tgtEl>
                                         <p:attrNameLst>
                                           <p:attrName>style.visibility</p:attrName>
@@ -8644,7 +8437,7 @@
                                       <p:cBhvr>
                                         <p:cTn id="109" dur="500"/>
                                         <p:tgtEl>
-                                          <p:spTgt spid="91"/>
+                                          <p:spTgt spid="97"/>
                                         </p:tgtEl>
                                       </p:cBhvr>
                                     </p:animEffect>
@@ -8652,7 +8445,7 @@
                                 </p:cTn>
                               </p:par>
                               <p:par>
-                                <p:cTn id="110" presetID="10" presetClass="entr" presetSubtype="0" fill="hold" grpId="0" nodeType="withEffect">
+                                <p:cTn id="110" presetID="10" presetClass="entr" presetSubtype="0" fill="hold" nodeType="withEffect">
                                   <p:stCondLst>
                                     <p:cond delay="0"/>
                                   </p:stCondLst>
@@ -8665,7 +8458,7 @@
                                           </p:stCondLst>
                                         </p:cTn>
                                         <p:tgtEl>
-                                          <p:spTgt spid="11"/>
+                                          <p:spTgt spid="96"/>
                                         </p:tgtEl>
                                         <p:attrNameLst>
                                           <p:attrName>style.visibility</p:attrName>
@@ -8679,7 +8472,7 @@
                                       <p:cBhvr>
                                         <p:cTn id="112" dur="500"/>
                                         <p:tgtEl>
-                                          <p:spTgt spid="11"/>
+                                          <p:spTgt spid="96"/>
                                         </p:tgtEl>
                                       </p:cBhvr>
                                     </p:animEffect>
@@ -8687,7 +8480,7 @@
                                 </p:cTn>
                               </p:par>
                               <p:par>
-                                <p:cTn id="113" presetID="10" presetClass="entr" presetSubtype="0" fill="hold" grpId="0" nodeType="withEffect">
+                                <p:cTn id="113" presetID="10" presetClass="entr" presetSubtype="0" fill="hold" nodeType="withEffect">
                                   <p:stCondLst>
                                     <p:cond delay="0"/>
                                   </p:stCondLst>
@@ -8700,7 +8493,7 @@
                                           </p:stCondLst>
                                         </p:cTn>
                                         <p:tgtEl>
-                                          <p:spTgt spid="120"/>
+                                          <p:spTgt spid="101"/>
                                         </p:tgtEl>
                                         <p:attrNameLst>
                                           <p:attrName>style.visibility</p:attrName>
@@ -8714,7 +8507,7 @@
                                       <p:cBhvr>
                                         <p:cTn id="115" dur="500"/>
                                         <p:tgtEl>
-                                          <p:spTgt spid="120"/>
+                                          <p:spTgt spid="101"/>
                                         </p:tgtEl>
                                       </p:cBhvr>
                                     </p:animEffect>
@@ -8735,7 +8528,7 @@
                                           </p:stCondLst>
                                         </p:cTn>
                                         <p:tgtEl>
-                                          <p:spTgt spid="121"/>
+                                          <p:spTgt spid="99"/>
                                         </p:tgtEl>
                                         <p:attrNameLst>
                                           <p:attrName>style.visibility</p:attrName>
@@ -8749,164 +8542,6 @@
                                       <p:cBhvr>
                                         <p:cTn id="118" dur="500"/>
                                         <p:tgtEl>
-                                          <p:spTgt spid="121"/>
-                                        </p:tgtEl>
-                                      </p:cBhvr>
-                                    </p:animEffect>
-                                  </p:childTnLst>
-                                </p:cTn>
-                              </p:par>
-                            </p:childTnLst>
-                          </p:cTn>
-                        </p:par>
-                      </p:childTnLst>
-                    </p:cTn>
-                  </p:par>
-                  <p:par>
-                    <p:cTn id="119" fill="hold">
-                      <p:stCondLst>
-                        <p:cond delay="indefinite"/>
-                      </p:stCondLst>
-                      <p:childTnLst>
-                        <p:par>
-                          <p:cTn id="120" fill="hold">
-                            <p:stCondLst>
-                              <p:cond delay="0"/>
-                            </p:stCondLst>
-                            <p:childTnLst>
-                              <p:par>
-                                <p:cTn id="121" presetID="10" presetClass="entr" presetSubtype="0" fill="hold" nodeType="clickEffect">
-                                  <p:stCondLst>
-                                    <p:cond delay="0"/>
-                                  </p:stCondLst>
-                                  <p:childTnLst>
-                                    <p:set>
-                                      <p:cBhvr>
-                                        <p:cTn id="122" dur="1" fill="hold">
-                                          <p:stCondLst>
-                                            <p:cond delay="0"/>
-                                          </p:stCondLst>
-                                        </p:cTn>
-                                        <p:tgtEl>
-                                          <p:spTgt spid="97"/>
-                                        </p:tgtEl>
-                                        <p:attrNameLst>
-                                          <p:attrName>style.visibility</p:attrName>
-                                        </p:attrNameLst>
-                                      </p:cBhvr>
-                                      <p:to>
-                                        <p:strVal val="visible"/>
-                                      </p:to>
-                                    </p:set>
-                                    <p:animEffect transition="in" filter="fade">
-                                      <p:cBhvr>
-                                        <p:cTn id="123" dur="500"/>
-                                        <p:tgtEl>
-                                          <p:spTgt spid="97"/>
-                                        </p:tgtEl>
-                                      </p:cBhvr>
-                                    </p:animEffect>
-                                  </p:childTnLst>
-                                </p:cTn>
-                              </p:par>
-                              <p:par>
-                                <p:cTn id="124" presetID="10" presetClass="entr" presetSubtype="0" fill="hold" nodeType="withEffect">
-                                  <p:stCondLst>
-                                    <p:cond delay="0"/>
-                                  </p:stCondLst>
-                                  <p:childTnLst>
-                                    <p:set>
-                                      <p:cBhvr>
-                                        <p:cTn id="125" dur="1" fill="hold">
-                                          <p:stCondLst>
-                                            <p:cond delay="0"/>
-                                          </p:stCondLst>
-                                        </p:cTn>
-                                        <p:tgtEl>
-                                          <p:spTgt spid="96"/>
-                                        </p:tgtEl>
-                                        <p:attrNameLst>
-                                          <p:attrName>style.visibility</p:attrName>
-                                        </p:attrNameLst>
-                                      </p:cBhvr>
-                                      <p:to>
-                                        <p:strVal val="visible"/>
-                                      </p:to>
-                                    </p:set>
-                                    <p:animEffect transition="in" filter="fade">
-                                      <p:cBhvr>
-                                        <p:cTn id="126" dur="500"/>
-                                        <p:tgtEl>
-                                          <p:spTgt spid="96"/>
-                                        </p:tgtEl>
-                                      </p:cBhvr>
-                                    </p:animEffect>
-                                  </p:childTnLst>
-                                </p:cTn>
-                              </p:par>
-                              <p:par>
-                                <p:cTn id="127" presetID="10" presetClass="entr" presetSubtype="0" fill="hold" nodeType="withEffect">
-                                  <p:stCondLst>
-                                    <p:cond delay="0"/>
-                                  </p:stCondLst>
-                                  <p:childTnLst>
-                                    <p:set>
-                                      <p:cBhvr>
-                                        <p:cTn id="128" dur="1" fill="hold">
-                                          <p:stCondLst>
-                                            <p:cond delay="0"/>
-                                          </p:stCondLst>
-                                        </p:cTn>
-                                        <p:tgtEl>
-                                          <p:spTgt spid="101"/>
-                                        </p:tgtEl>
-                                        <p:attrNameLst>
-                                          <p:attrName>style.visibility</p:attrName>
-                                        </p:attrNameLst>
-                                      </p:cBhvr>
-                                      <p:to>
-                                        <p:strVal val="visible"/>
-                                      </p:to>
-                                    </p:set>
-                                    <p:animEffect transition="in" filter="fade">
-                                      <p:cBhvr>
-                                        <p:cTn id="129" dur="500"/>
-                                        <p:tgtEl>
-                                          <p:spTgt spid="101"/>
-                                        </p:tgtEl>
-                                      </p:cBhvr>
-                                    </p:animEffect>
-                                  </p:childTnLst>
-                                </p:cTn>
-                              </p:par>
-                              <p:par>
-                                <p:cTn id="130" presetID="10" presetClass="entr" presetSubtype="0" fill="hold" nodeType="withEffect">
-                                  <p:stCondLst>
-                                    <p:cond delay="0"/>
-                                  </p:stCondLst>
-                                  <p:childTnLst>
-                                    <p:set>
-                                      <p:cBhvr>
-                                        <p:cTn id="131" dur="1" fill="hold">
-                                          <p:stCondLst>
-                                            <p:cond delay="0"/>
-                                          </p:stCondLst>
-                                        </p:cTn>
-                                        <p:tgtEl>
-                                          <p:spTgt spid="99"/>
-                                        </p:tgtEl>
-                                        <p:attrNameLst>
-                                          <p:attrName>style.visibility</p:attrName>
-                                        </p:attrNameLst>
-                                      </p:cBhvr>
-                                      <p:to>
-                                        <p:strVal val="visible"/>
-                                      </p:to>
-                                    </p:set>
-                                    <p:animEffect transition="in" filter="fade">
-                                      <p:cBhvr>
-                                        <p:cTn id="132" dur="500"/>
-                                        <p:tgtEl>
                                           <p:spTgt spid="99"/>
                                         </p:tgtEl>
                                       </p:cBhvr>
@@ -8915,14 +8550,14 @@
                                 </p:cTn>
                               </p:par>
                               <p:par>
-                                <p:cTn id="133" presetID="10" presetClass="entr" presetSubtype="0" fill="hold" grpId="0" nodeType="withEffect">
+                                <p:cTn id="119" presetID="10" presetClass="entr" presetSubtype="0" fill="hold" grpId="0" nodeType="withEffect">
                                   <p:stCondLst>
                                     <p:cond delay="0"/>
                                   </p:stCondLst>
                                   <p:childTnLst>
                                     <p:set>
                                       <p:cBhvr>
-                                        <p:cTn id="134" dur="1" fill="hold">
+                                        <p:cTn id="120" dur="1" fill="hold">
                                           <p:stCondLst>
                                             <p:cond delay="0"/>
                                           </p:stCondLst>
@@ -8940,7 +8575,7 @@
                                     </p:set>
                                     <p:animEffect transition="in" filter="fade">
                                       <p:cBhvr>
-                                        <p:cTn id="135" dur="500"/>
+                                        <p:cTn id="121" dur="500"/>
                                         <p:tgtEl>
                                           <p:spTgt spid="94"/>
                                         </p:tgtEl>
@@ -8950,14 +8585,14 @@
                                 </p:cTn>
                               </p:par>
                               <p:par>
-                                <p:cTn id="136" presetID="10" presetClass="entr" presetSubtype="0" fill="hold" nodeType="withEffect">
+                                <p:cTn id="122" presetID="10" presetClass="entr" presetSubtype="0" fill="hold" nodeType="withEffect">
                                   <p:stCondLst>
                                     <p:cond delay="0"/>
                                   </p:stCondLst>
                                   <p:childTnLst>
                                     <p:set>
                                       <p:cBhvr>
-                                        <p:cTn id="137" dur="1" fill="hold">
+                                        <p:cTn id="123" dur="1" fill="hold">
                                           <p:stCondLst>
                                             <p:cond delay="0"/>
                                           </p:stCondLst>
@@ -8975,7 +8610,7 @@
                                     </p:set>
                                     <p:animEffect transition="in" filter="fade">
                                       <p:cBhvr>
-                                        <p:cTn id="138" dur="500"/>
+                                        <p:cTn id="124" dur="500"/>
                                         <p:tgtEl>
                                           <p:spTgt spid="105"/>
                                         </p:tgtEl>
@@ -8985,14 +8620,14 @@
                                 </p:cTn>
                               </p:par>
                               <p:par>
-                                <p:cTn id="139" presetID="10" presetClass="entr" presetSubtype="0" fill="hold" nodeType="withEffect">
+                                <p:cTn id="125" presetID="10" presetClass="entr" presetSubtype="0" fill="hold" nodeType="withEffect">
                                   <p:stCondLst>
                                     <p:cond delay="0"/>
                                   </p:stCondLst>
                                   <p:childTnLst>
                                     <p:set>
                                       <p:cBhvr>
-                                        <p:cTn id="140" dur="1" fill="hold">
+                                        <p:cTn id="126" dur="1" fill="hold">
                                           <p:stCondLst>
                                             <p:cond delay="0"/>
                                           </p:stCondLst>
@@ -9010,7 +8645,7 @@
                                     </p:set>
                                     <p:animEffect transition="in" filter="fade">
                                       <p:cBhvr>
-                                        <p:cTn id="141" dur="500"/>
+                                        <p:cTn id="127" dur="500"/>
                                         <p:tgtEl>
                                           <p:spTgt spid="107"/>
                                         </p:tgtEl>
@@ -9047,19 +8682,16 @@
       </p:par>
     </p:tnLst>
     <p:bldLst>
-      <p:bldP spid="91" grpId="0" animBg="1"/>
       <p:bldP spid="89" grpId="0" animBg="1"/>
       <p:bldP spid="5" grpId="0" animBg="1"/>
       <p:bldP spid="6" grpId="0" animBg="1"/>
       <p:bldP spid="8" grpId="0" animBg="1"/>
-      <p:bldP spid="11" grpId="0" animBg="1"/>
       <p:bldP spid="13" grpId="0" animBg="1"/>
       <p:bldP spid="63" grpId="0" animBg="1"/>
       <p:bldP spid="64" grpId="0" animBg="1"/>
       <p:bldP spid="65" grpId="0" animBg="1"/>
       <p:bldP spid="94" grpId="0" animBg="1"/>
       <p:bldP spid="116" grpId="0" animBg="1"/>
-      <p:bldP spid="120" grpId="0" animBg="1"/>
     </p:bldLst>
   </p:timing>
 </p:sld>

</xml_diff>

<commit_message>
Update images and sections to refer to image
</commit_message>
<xml_diff>
--- a/docs/diagrams/diagrams.pptx
+++ b/docs/diagrams/diagrams.pptx
@@ -245,7 +245,7 @@
           <a:p>
             <a:fld id="{F4C5997A-E221-43A6-9AE7-DBA0CB9777B0}" type="datetimeFigureOut">
               <a:rPr lang="en-US" smtClean="0"/>
-              <a:t>6/27/2018</a:t>
+              <a:t>7/2/2018</a:t>
             </a:fld>
             <a:endParaRPr lang="en-US"/>
           </a:p>
@@ -415,7 +415,7 @@
           <a:p>
             <a:fld id="{F4C5997A-E221-43A6-9AE7-DBA0CB9777B0}" type="datetimeFigureOut">
               <a:rPr lang="en-US" smtClean="0"/>
-              <a:t>6/27/2018</a:t>
+              <a:t>7/2/2018</a:t>
             </a:fld>
             <a:endParaRPr lang="en-US"/>
           </a:p>
@@ -595,7 +595,7 @@
           <a:p>
             <a:fld id="{F4C5997A-E221-43A6-9AE7-DBA0CB9777B0}" type="datetimeFigureOut">
               <a:rPr lang="en-US" smtClean="0"/>
-              <a:t>6/27/2018</a:t>
+              <a:t>7/2/2018</a:t>
             </a:fld>
             <a:endParaRPr lang="en-US"/>
           </a:p>
@@ -765,7 +765,7 @@
           <a:p>
             <a:fld id="{F4C5997A-E221-43A6-9AE7-DBA0CB9777B0}" type="datetimeFigureOut">
               <a:rPr lang="en-US" smtClean="0"/>
-              <a:t>6/27/2018</a:t>
+              <a:t>7/2/2018</a:t>
             </a:fld>
             <a:endParaRPr lang="en-US"/>
           </a:p>
@@ -1011,7 +1011,7 @@
           <a:p>
             <a:fld id="{F4C5997A-E221-43A6-9AE7-DBA0CB9777B0}" type="datetimeFigureOut">
               <a:rPr lang="en-US" smtClean="0"/>
-              <a:t>6/27/2018</a:t>
+              <a:t>7/2/2018</a:t>
             </a:fld>
             <a:endParaRPr lang="en-US"/>
           </a:p>
@@ -1243,7 +1243,7 @@
           <a:p>
             <a:fld id="{F4C5997A-E221-43A6-9AE7-DBA0CB9777B0}" type="datetimeFigureOut">
               <a:rPr lang="en-US" smtClean="0"/>
-              <a:t>6/27/2018</a:t>
+              <a:t>7/2/2018</a:t>
             </a:fld>
             <a:endParaRPr lang="en-US"/>
           </a:p>
@@ -1610,7 +1610,7 @@
           <a:p>
             <a:fld id="{F4C5997A-E221-43A6-9AE7-DBA0CB9777B0}" type="datetimeFigureOut">
               <a:rPr lang="en-US" smtClean="0"/>
-              <a:t>6/27/2018</a:t>
+              <a:t>7/2/2018</a:t>
             </a:fld>
             <a:endParaRPr lang="en-US"/>
           </a:p>
@@ -1728,7 +1728,7 @@
           <a:p>
             <a:fld id="{F4C5997A-E221-43A6-9AE7-DBA0CB9777B0}" type="datetimeFigureOut">
               <a:rPr lang="en-US" smtClean="0"/>
-              <a:t>6/27/2018</a:t>
+              <a:t>7/2/2018</a:t>
             </a:fld>
             <a:endParaRPr lang="en-US"/>
           </a:p>
@@ -1823,7 +1823,7 @@
           <a:p>
             <a:fld id="{F4C5997A-E221-43A6-9AE7-DBA0CB9777B0}" type="datetimeFigureOut">
               <a:rPr lang="en-US" smtClean="0"/>
-              <a:t>6/27/2018</a:t>
+              <a:t>7/2/2018</a:t>
             </a:fld>
             <a:endParaRPr lang="en-US"/>
           </a:p>
@@ -2100,7 +2100,7 @@
           <a:p>
             <a:fld id="{F4C5997A-E221-43A6-9AE7-DBA0CB9777B0}" type="datetimeFigureOut">
               <a:rPr lang="en-US" smtClean="0"/>
-              <a:t>6/27/2018</a:t>
+              <a:t>7/2/2018</a:t>
             </a:fld>
             <a:endParaRPr lang="en-US"/>
           </a:p>
@@ -2353,7 +2353,7 @@
           <a:p>
             <a:fld id="{F4C5997A-E221-43A6-9AE7-DBA0CB9777B0}" type="datetimeFigureOut">
               <a:rPr lang="en-US" smtClean="0"/>
-              <a:t>6/27/2018</a:t>
+              <a:t>7/2/2018</a:t>
             </a:fld>
             <a:endParaRPr lang="en-US"/>
           </a:p>
@@ -2566,7 +2566,7 @@
           <a:p>
             <a:fld id="{F4C5997A-E221-43A6-9AE7-DBA0CB9777B0}" type="datetimeFigureOut">
               <a:rPr lang="en-US" smtClean="0"/>
-              <a:t>6/27/2018</a:t>
+              <a:t>7/2/2018</a:t>
             </a:fld>
             <a:endParaRPr lang="en-US"/>
           </a:p>
@@ -7185,6 +7185,224 @@
             </a:solidFill>
             <a:prstDash val="lgDash"/>
             <a:tailEnd type="triangle"/>
+          </a:ln>
+        </p:spPr>
+        <p:style>
+          <a:lnRef idx="1">
+            <a:schemeClr val="accent1"/>
+          </a:lnRef>
+          <a:fillRef idx="0">
+            <a:schemeClr val="accent1"/>
+          </a:fillRef>
+          <a:effectRef idx="0">
+            <a:schemeClr val="accent1"/>
+          </a:effectRef>
+          <a:fontRef idx="minor">
+            <a:schemeClr val="tx1"/>
+          </a:fontRef>
+        </p:style>
+      </p:cxnSp>
+      <p:sp>
+        <p:nvSpPr>
+          <p:cNvPr id="91" name="Rectangle 90"/>
+          <p:cNvSpPr/>
+          <p:nvPr/>
+        </p:nvSpPr>
+        <p:spPr>
+          <a:xfrm rot="5400000">
+            <a:off x="2182038" y="2234485"/>
+            <a:ext cx="370956" cy="739070"/>
+          </a:xfrm>
+          <a:prstGeom prst="rect">
+            <a:avLst/>
+          </a:prstGeom>
+          <a:solidFill>
+            <a:srgbClr val="0070C0"/>
+          </a:solidFill>
+          <a:ln>
+            <a:solidFill>
+              <a:srgbClr val="0070C0"/>
+            </a:solidFill>
+          </a:ln>
+        </p:spPr>
+        <p:style>
+          <a:lnRef idx="2">
+            <a:schemeClr val="accent1">
+              <a:shade val="50000"/>
+            </a:schemeClr>
+          </a:lnRef>
+          <a:fillRef idx="1">
+            <a:schemeClr val="accent1"/>
+          </a:fillRef>
+          <a:effectRef idx="0">
+            <a:schemeClr val="accent1"/>
+          </a:effectRef>
+          <a:fontRef idx="minor">
+            <a:schemeClr val="lt1"/>
+          </a:fontRef>
+        </p:style>
+        <p:txBody>
+          <a:bodyPr vert="vert270" rtlCol="0" anchor="ctr"/>
+          <a:lstStyle/>
+          <a:p>
+            <a:pPr algn="ctr"/>
+            <a:r>
+              <a:rPr lang="en-US" sz="1200" dirty="0" smtClean="0"/>
+              <a:t>Model</a:t>
+            </a:r>
+            <a:endParaRPr lang="en-US" sz="1200" dirty="0"/>
+          </a:p>
+        </p:txBody>
+      </p:sp>
+      <p:sp>
+        <p:nvSpPr>
+          <p:cNvPr id="93" name="Rectangle 92"/>
+          <p:cNvSpPr/>
+          <p:nvPr/>
+        </p:nvSpPr>
+        <p:spPr>
+          <a:xfrm rot="5400000">
+            <a:off x="3079761" y="2234485"/>
+            <a:ext cx="370956" cy="739070"/>
+          </a:xfrm>
+          <a:prstGeom prst="rect">
+            <a:avLst/>
+          </a:prstGeom>
+          <a:solidFill>
+            <a:srgbClr val="0070C0"/>
+          </a:solidFill>
+          <a:ln>
+            <a:solidFill>
+              <a:srgbClr val="0070C0"/>
+            </a:solidFill>
+          </a:ln>
+        </p:spPr>
+        <p:style>
+          <a:lnRef idx="2">
+            <a:schemeClr val="accent1">
+              <a:shade val="50000"/>
+            </a:schemeClr>
+          </a:lnRef>
+          <a:fillRef idx="1">
+            <a:schemeClr val="accent1"/>
+          </a:fillRef>
+          <a:effectRef idx="0">
+            <a:schemeClr val="accent1"/>
+          </a:effectRef>
+          <a:fontRef idx="minor">
+            <a:schemeClr val="lt1"/>
+          </a:fontRef>
+        </p:style>
+        <p:txBody>
+          <a:bodyPr vert="vert270" rtlCol="0" anchor="ctr"/>
+          <a:lstStyle/>
+          <a:p>
+            <a:pPr algn="ctr"/>
+            <a:r>
+              <a:rPr lang="en-US" sz="1200" dirty="0" smtClean="0"/>
+              <a:t>System</a:t>
+            </a:r>
+            <a:endParaRPr lang="en-US" sz="1200" dirty="0"/>
+          </a:p>
+        </p:txBody>
+      </p:sp>
+      <p:cxnSp>
+        <p:nvCxnSpPr>
+          <p:cNvPr id="108" name="Straight Arrow Connector 107"/>
+          <p:cNvCxnSpPr/>
+          <p:nvPr/>
+        </p:nvCxnSpPr>
+        <p:spPr>
+          <a:xfrm>
+            <a:off x="2547181" y="2900760"/>
+            <a:ext cx="1" cy="259483"/>
+          </a:xfrm>
+          <a:prstGeom prst="straightConnector1">
+            <a:avLst/>
+          </a:prstGeom>
+          <a:ln w="19050">
+            <a:solidFill>
+              <a:srgbClr val="0070C0"/>
+            </a:solidFill>
+            <a:prstDash val="solid"/>
+            <a:headEnd type="triangle" w="med" len="med"/>
+            <a:tailEnd type="none" w="med" len="med"/>
+          </a:ln>
+        </p:spPr>
+        <p:style>
+          <a:lnRef idx="1">
+            <a:schemeClr val="accent1"/>
+          </a:lnRef>
+          <a:fillRef idx="0">
+            <a:schemeClr val="accent1"/>
+          </a:fillRef>
+          <a:effectRef idx="0">
+            <a:schemeClr val="accent1"/>
+          </a:effectRef>
+          <a:fontRef idx="minor">
+            <a:schemeClr val="tx1"/>
+          </a:fontRef>
+        </p:style>
+      </p:cxnSp>
+      <p:cxnSp>
+        <p:nvCxnSpPr>
+          <p:cNvPr id="109" name="Straight Arrow Connector 108"/>
+          <p:cNvCxnSpPr/>
+          <p:nvPr/>
+        </p:nvCxnSpPr>
+        <p:spPr>
+          <a:xfrm>
+            <a:off x="2805211" y="2908513"/>
+            <a:ext cx="1" cy="259483"/>
+          </a:xfrm>
+          <a:prstGeom prst="straightConnector1">
+            <a:avLst/>
+          </a:prstGeom>
+          <a:ln w="19050">
+            <a:solidFill>
+              <a:srgbClr val="0070C0"/>
+            </a:solidFill>
+            <a:prstDash val="solid"/>
+            <a:headEnd type="triangle" w="med" len="med"/>
+            <a:tailEnd type="none" w="med" len="med"/>
+          </a:ln>
+        </p:spPr>
+        <p:style>
+          <a:lnRef idx="1">
+            <a:schemeClr val="accent1"/>
+          </a:lnRef>
+          <a:fillRef idx="0">
+            <a:schemeClr val="accent1"/>
+          </a:fillRef>
+          <a:effectRef idx="0">
+            <a:schemeClr val="accent1"/>
+          </a:effectRef>
+          <a:fontRef idx="minor">
+            <a:schemeClr val="tx1"/>
+          </a:fontRef>
+        </p:style>
+      </p:cxnSp>
+      <p:cxnSp>
+        <p:nvCxnSpPr>
+          <p:cNvPr id="112" name="Straight Arrow Connector 111"/>
+          <p:cNvCxnSpPr/>
+          <p:nvPr/>
+        </p:nvCxnSpPr>
+        <p:spPr>
+          <a:xfrm>
+            <a:off x="3053293" y="2908096"/>
+            <a:ext cx="1" cy="259483"/>
+          </a:xfrm>
+          <a:prstGeom prst="straightConnector1">
+            <a:avLst/>
+          </a:prstGeom>
+          <a:ln w="19050">
+            <a:solidFill>
+              <a:srgbClr val="0070C0"/>
+            </a:solidFill>
+            <a:prstDash val="solid"/>
+            <a:headEnd type="triangle" w="med" len="med"/>
+            <a:tailEnd type="none" w="med" len="med"/>
           </a:ln>
         </p:spPr>
         <p:style>
@@ -8654,6 +8872,111 @@
                                   </p:childTnLst>
                                 </p:cTn>
                               </p:par>
+                              <p:par>
+                                <p:cTn id="128" presetID="10" presetClass="entr" presetSubtype="0" fill="hold" nodeType="withEffect">
+                                  <p:stCondLst>
+                                    <p:cond delay="0"/>
+                                  </p:stCondLst>
+                                  <p:childTnLst>
+                                    <p:set>
+                                      <p:cBhvr>
+                                        <p:cTn id="129" dur="1" fill="hold">
+                                          <p:stCondLst>
+                                            <p:cond delay="0"/>
+                                          </p:stCondLst>
+                                        </p:cTn>
+                                        <p:tgtEl>
+                                          <p:spTgt spid="108"/>
+                                        </p:tgtEl>
+                                        <p:attrNameLst>
+                                          <p:attrName>style.visibility</p:attrName>
+                                        </p:attrNameLst>
+                                      </p:cBhvr>
+                                      <p:to>
+                                        <p:strVal val="visible"/>
+                                      </p:to>
+                                    </p:set>
+                                    <p:animEffect transition="in" filter="fade">
+                                      <p:cBhvr>
+                                        <p:cTn id="130" dur="500"/>
+                                        <p:tgtEl>
+                                          <p:spTgt spid="108"/>
+                                        </p:tgtEl>
+                                      </p:cBhvr>
+                                    </p:animEffect>
+                                  </p:childTnLst>
+                                </p:cTn>
+                              </p:par>
+                              <p:par>
+                                <p:cTn id="131" presetID="10" presetClass="entr" presetSubtype="0" fill="hold" nodeType="withEffect">
+                                  <p:stCondLst>
+                                    <p:cond delay="0"/>
+                                  </p:stCondLst>
+                                  <p:childTnLst>
+                                    <p:set>
+                                      <p:cBhvr>
+                                        <p:cTn id="132" dur="1" fill="hold">
+                                          <p:stCondLst>
+                                            <p:cond delay="0"/>
+                                          </p:stCondLst>
+                                        </p:cTn>
+                                        <p:tgtEl>
+                                          <p:spTgt spid="109"/>
+                                        </p:tgtEl>
+                                        <p:attrNameLst>
+                                          <p:attrName>style.visibility</p:attrName>
+                                        </p:attrNameLst>
+                                      </p:cBhvr>
+                                      <p:to>
+                                        <p:strVal val="visible"/>
+                                      </p:to>
+                                    </p:set>
+                                    <p:animEffect transition="in" filter="fade">
+                                      <p:cBhvr>
+                                        <p:cTn id="133" dur="500"/>
+                                        <p:tgtEl>
+                                          <p:spTgt spid="109"/>
+                                        </p:tgtEl>
+                                      </p:cBhvr>
+                                    </p:animEffect>
+                                  </p:childTnLst>
+                                </p:cTn>
+                              </p:par>
+                              <p:par>
+                                <p:cTn id="134" presetID="10" presetClass="entr" presetSubtype="0" fill="hold" nodeType="withEffect">
+                                  <p:stCondLst>
+                                    <p:cond delay="0"/>
+                                  </p:stCondLst>
+                                  <p:childTnLst>
+                                    <p:set>
+                                      <p:cBhvr>
+                                        <p:cTn id="135" dur="1" fill="hold">
+                                          <p:stCondLst>
+                                            <p:cond delay="0"/>
+                                          </p:stCondLst>
+                                        </p:cTn>
+                                        <p:tgtEl>
+                                          <p:spTgt spid="112"/>
+                                        </p:tgtEl>
+                                        <p:attrNameLst>
+                                          <p:attrName>style.visibility</p:attrName>
+                                        </p:attrNameLst>
+                                      </p:cBhvr>
+                                      <p:to>
+                                        <p:strVal val="visible"/>
+                                      </p:to>
+                                    </p:set>
+                                    <p:animEffect transition="in" filter="fade">
+                                      <p:cBhvr>
+                                        <p:cTn id="136" dur="500"/>
+                                        <p:tgtEl>
+                                          <p:spTgt spid="112"/>
+                                        </p:tgtEl>
+                                      </p:cBhvr>
+                                    </p:animEffect>
+                                  </p:childTnLst>
+                                </p:cTn>
+                              </p:par>
                             </p:childTnLst>
                           </p:cTn>
                         </p:par>

</xml_diff>